<commit_message>
changed some details High scores and Presentation
</commit_message>
<xml_diff>
--- a/Presentation.pptx
+++ b/Presentation.pptx
@@ -494,7 +494,7 @@
           <a:p>
             <a:fld id="{64D80F8B-51B6-4E6B-881C-71C4F5DD9521}" type="datetimeFigureOut">
               <a:rPr lang="ru-RU" smtClean="0"/>
-              <a:t>04.06.2013</a:t>
+              <a:t>05.06.2013</a:t>
             </a:fld>
             <a:endParaRPr lang="ru-RU"/>
           </a:p>
@@ -674,7 +674,7 @@
           <a:p>
             <a:fld id="{64D80F8B-51B6-4E6B-881C-71C4F5DD9521}" type="datetimeFigureOut">
               <a:rPr lang="ru-RU" smtClean="0"/>
-              <a:t>04.06.2013</a:t>
+              <a:t>05.06.2013</a:t>
             </a:fld>
             <a:endParaRPr lang="ru-RU"/>
           </a:p>
@@ -844,7 +844,7 @@
           <a:p>
             <a:fld id="{64D80F8B-51B6-4E6B-881C-71C4F5DD9521}" type="datetimeFigureOut">
               <a:rPr lang="ru-RU" smtClean="0"/>
-              <a:t>04.06.2013</a:t>
+              <a:t>05.06.2013</a:t>
             </a:fld>
             <a:endParaRPr lang="ru-RU"/>
           </a:p>
@@ -1097,7 +1097,7 @@
           <a:p>
             <a:fld id="{64D80F8B-51B6-4E6B-881C-71C4F5DD9521}" type="datetimeFigureOut">
               <a:rPr lang="ru-RU" smtClean="0"/>
-              <a:t>04.06.2013</a:t>
+              <a:t>05.06.2013</a:t>
             </a:fld>
             <a:endParaRPr lang="ru-RU"/>
           </a:p>
@@ -1385,7 +1385,7 @@
           <a:p>
             <a:fld id="{64D80F8B-51B6-4E6B-881C-71C4F5DD9521}" type="datetimeFigureOut">
               <a:rPr lang="ru-RU" smtClean="0"/>
-              <a:t>04.06.2013</a:t>
+              <a:t>05.06.2013</a:t>
             </a:fld>
             <a:endParaRPr lang="ru-RU"/>
           </a:p>
@@ -1807,7 +1807,7 @@
           <a:p>
             <a:fld id="{64D80F8B-51B6-4E6B-881C-71C4F5DD9521}" type="datetimeFigureOut">
               <a:rPr lang="ru-RU" smtClean="0"/>
-              <a:t>04.06.2013</a:t>
+              <a:t>05.06.2013</a:t>
             </a:fld>
             <a:endParaRPr lang="ru-RU"/>
           </a:p>
@@ -1925,7 +1925,7 @@
           <a:p>
             <a:fld id="{64D80F8B-51B6-4E6B-881C-71C4F5DD9521}" type="datetimeFigureOut">
               <a:rPr lang="ru-RU" smtClean="0"/>
-              <a:t>04.06.2013</a:t>
+              <a:t>05.06.2013</a:t>
             </a:fld>
             <a:endParaRPr lang="ru-RU"/>
           </a:p>
@@ -2020,7 +2020,7 @@
           <a:p>
             <a:fld id="{64D80F8B-51B6-4E6B-881C-71C4F5DD9521}" type="datetimeFigureOut">
               <a:rPr lang="ru-RU" smtClean="0"/>
-              <a:t>04.06.2013</a:t>
+              <a:t>05.06.2013</a:t>
             </a:fld>
             <a:endParaRPr lang="ru-RU"/>
           </a:p>
@@ -2297,7 +2297,7 @@
           <a:p>
             <a:fld id="{64D80F8B-51B6-4E6B-881C-71C4F5DD9521}" type="datetimeFigureOut">
               <a:rPr lang="ru-RU" smtClean="0"/>
-              <a:t>04.06.2013</a:t>
+              <a:t>05.06.2013</a:t>
             </a:fld>
             <a:endParaRPr lang="ru-RU"/>
           </a:p>
@@ -2550,7 +2550,7 @@
           <a:p>
             <a:fld id="{64D80F8B-51B6-4E6B-881C-71C4F5DD9521}" type="datetimeFigureOut">
               <a:rPr lang="ru-RU" smtClean="0"/>
-              <a:t>04.06.2013</a:t>
+              <a:t>05.06.2013</a:t>
             </a:fld>
             <a:endParaRPr lang="ru-RU"/>
           </a:p>
@@ -2787,7 +2787,7 @@
           <a:p>
             <a:fld id="{64D80F8B-51B6-4E6B-881C-71C4F5DD9521}" type="datetimeFigureOut">
               <a:rPr lang="ru-RU" smtClean="0"/>
-              <a:t>04.06.2013</a:t>
+              <a:t>05.06.2013</a:t>
             </a:fld>
             <a:endParaRPr lang="ru-RU"/>
           </a:p>
@@ -3389,7 +3389,6 @@
               <a:rPr lang="uk-UA" dirty="0" smtClean="0"/>
               <a:t>Давидович Галина</a:t>
             </a:r>
-            <a:endParaRPr lang="uk-UA" dirty="0" smtClean="0"/>
           </a:p>
           <a:p>
             <a:r>
@@ -3719,7 +3718,7 @@
       </p:grpSpPr>
       <p:pic>
         <p:nvPicPr>
-          <p:cNvPr id="3074" name="Picture 2"/>
+          <p:cNvPr id="1026" name="Picture 2"/>
           <p:cNvPicPr>
             <a:picLocks noChangeAspect="1" noChangeArrowheads="1"/>
           </p:cNvPicPr>
@@ -3740,8 +3739,8 @@
         </p:blipFill>
         <p:spPr bwMode="auto">
           <a:xfrm>
-            <a:off x="328346" y="1350439"/>
-            <a:ext cx="4036666" cy="4752528"/>
+            <a:off x="323527" y="2636912"/>
+            <a:ext cx="6150507" cy="3833368"/>
           </a:xfrm>
           <a:prstGeom prst="rect">
             <a:avLst/>
@@ -3804,8 +3803,8 @@
         </p:blipFill>
         <p:spPr bwMode="auto">
           <a:xfrm>
-            <a:off x="4644008" y="1889236"/>
-            <a:ext cx="4215640" cy="3816424"/>
+            <a:off x="5231271" y="332656"/>
+            <a:ext cx="3628375" cy="3284772"/>
           </a:xfrm>
           <a:prstGeom prst="rect">
             <a:avLst/>
@@ -3841,6 +3840,47 @@
                   </a:outerShdw>
                 </a:effectLst>
               </a14:hiddenEffects>
+            </a:ext>
+          </a:extLst>
+        </p:spPr>
+      </p:pic>
+      <p:pic>
+        <p:nvPicPr>
+          <p:cNvPr id="1029" name="Picture 5" descr="http://media.flasharcade.com/flashgames/img/Ultimate%20Snake.jpg"/>
+          <p:cNvPicPr>
+            <a:picLocks noChangeAspect="1" noChangeArrowheads="1"/>
+          </p:cNvPicPr>
+          <p:nvPr/>
+        </p:nvPicPr>
+        <p:blipFill>
+          <a:blip r:embed="rId4">
+            <a:extLst>
+              <a:ext uri="{28A0092B-C50C-407E-A947-70E740481C1C}">
+                <a14:useLocalDpi xmlns:a14="http://schemas.microsoft.com/office/drawing/2010/main" val="0"/>
+              </a:ext>
+            </a:extLst>
+          </a:blip>
+          <a:srcRect/>
+          <a:stretch>
+            <a:fillRect/>
+          </a:stretch>
+        </p:blipFill>
+        <p:spPr bwMode="auto">
+          <a:xfrm>
+            <a:off x="2987824" y="767373"/>
+            <a:ext cx="2243447" cy="1869539"/>
+          </a:xfrm>
+          <a:prstGeom prst="rect">
+            <a:avLst/>
+          </a:prstGeom>
+          <a:noFill/>
+          <a:extLst>
+            <a:ext uri="{909E8E84-426E-40DD-AFC4-6F175D3DCCD1}">
+              <a14:hiddenFill xmlns:a14="http://schemas.microsoft.com/office/drawing/2010/main">
+                <a:solidFill>
+                  <a:srgbClr val="FFFFFF"/>
+                </a:solidFill>
+              </a14:hiddenFill>
             </a:ext>
           </a:extLst>
         </p:spPr>
@@ -4163,7 +4203,6 @@
               <a:rPr lang="uk-UA" dirty="0" smtClean="0"/>
               <a:t>повна придатність для забезпечення професійної діяльності фахівців-програмістів</a:t>
             </a:r>
-            <a:endParaRPr lang="uk-UA" dirty="0" smtClean="0"/>
           </a:p>
         </p:txBody>
       </p:sp>

</xml_diff>